<commit_message>
Add title and tags on documents
</commit_message>
<xml_diff>
--- a/Documents/Mission impossible project presentation.pptx
+++ b/Documents/Mission impossible project presentation.pptx
@@ -108,6 +108,11 @@
       </a:defRPr>
     </a:lvl9pPr>
   </p:defaultTextStyle>
+  <p:extLst>
+    <p:ext uri="{EFAFB233-063F-42B5-8137-9DF3F51BA10A}">
+      <p15:sldGuideLst xmlns:p15="http://schemas.microsoft.com/office/powerpoint/2012/main"/>
+    </p:ext>
+  </p:extLst>
 </p:presentation>
 </file>
 
@@ -260,7 +265,7 @@
           <a:p>
             <a:fld id="{82D8F485-638F-48F0-AE9F-48157F84472E}" type="datetimeFigureOut">
               <a:rPr lang="bg-BG" smtClean="0"/>
-              <a:t>26.3.2023 г.</a:t>
+              <a:t>27.3.2023 г.</a:t>
             </a:fld>
             <a:endParaRPr lang="bg-BG"/>
           </a:p>
@@ -460,7 +465,7 @@
           <a:p>
             <a:fld id="{82D8F485-638F-48F0-AE9F-48157F84472E}" type="datetimeFigureOut">
               <a:rPr lang="bg-BG" smtClean="0"/>
-              <a:t>26.3.2023 г.</a:t>
+              <a:t>27.3.2023 г.</a:t>
             </a:fld>
             <a:endParaRPr lang="bg-BG"/>
           </a:p>
@@ -670,7 +675,7 @@
           <a:p>
             <a:fld id="{82D8F485-638F-48F0-AE9F-48157F84472E}" type="datetimeFigureOut">
               <a:rPr lang="bg-BG" smtClean="0"/>
-              <a:t>26.3.2023 г.</a:t>
+              <a:t>27.3.2023 г.</a:t>
             </a:fld>
             <a:endParaRPr lang="bg-BG"/>
           </a:p>
@@ -870,7 +875,7 @@
           <a:p>
             <a:fld id="{82D8F485-638F-48F0-AE9F-48157F84472E}" type="datetimeFigureOut">
               <a:rPr lang="bg-BG" smtClean="0"/>
-              <a:t>26.3.2023 г.</a:t>
+              <a:t>27.3.2023 г.</a:t>
             </a:fld>
             <a:endParaRPr lang="bg-BG"/>
           </a:p>
@@ -1146,7 +1151,7 @@
           <a:p>
             <a:fld id="{82D8F485-638F-48F0-AE9F-48157F84472E}" type="datetimeFigureOut">
               <a:rPr lang="bg-BG" smtClean="0"/>
-              <a:t>26.3.2023 г.</a:t>
+              <a:t>27.3.2023 г.</a:t>
             </a:fld>
             <a:endParaRPr lang="bg-BG"/>
           </a:p>
@@ -1414,7 +1419,7 @@
           <a:p>
             <a:fld id="{82D8F485-638F-48F0-AE9F-48157F84472E}" type="datetimeFigureOut">
               <a:rPr lang="bg-BG" smtClean="0"/>
-              <a:t>26.3.2023 г.</a:t>
+              <a:t>27.3.2023 г.</a:t>
             </a:fld>
             <a:endParaRPr lang="bg-BG"/>
           </a:p>
@@ -1829,7 +1834,7 @@
           <a:p>
             <a:fld id="{82D8F485-638F-48F0-AE9F-48157F84472E}" type="datetimeFigureOut">
               <a:rPr lang="bg-BG" smtClean="0"/>
-              <a:t>26.3.2023 г.</a:t>
+              <a:t>27.3.2023 г.</a:t>
             </a:fld>
             <a:endParaRPr lang="bg-BG"/>
           </a:p>
@@ -1971,7 +1976,7 @@
           <a:p>
             <a:fld id="{82D8F485-638F-48F0-AE9F-48157F84472E}" type="datetimeFigureOut">
               <a:rPr lang="bg-BG" smtClean="0"/>
-              <a:t>26.3.2023 г.</a:t>
+              <a:t>27.3.2023 г.</a:t>
             </a:fld>
             <a:endParaRPr lang="bg-BG"/>
           </a:p>
@@ -2084,7 +2089,7 @@
           <a:p>
             <a:fld id="{82D8F485-638F-48F0-AE9F-48157F84472E}" type="datetimeFigureOut">
               <a:rPr lang="bg-BG" smtClean="0"/>
-              <a:t>26.3.2023 г.</a:t>
+              <a:t>27.3.2023 г.</a:t>
             </a:fld>
             <a:endParaRPr lang="bg-BG"/>
           </a:p>
@@ -2397,7 +2402,7 @@
           <a:p>
             <a:fld id="{82D8F485-638F-48F0-AE9F-48157F84472E}" type="datetimeFigureOut">
               <a:rPr lang="bg-BG" smtClean="0"/>
-              <a:t>26.3.2023 г.</a:t>
+              <a:t>27.3.2023 г.</a:t>
             </a:fld>
             <a:endParaRPr lang="bg-BG"/>
           </a:p>
@@ -2686,7 +2691,7 @@
           <a:p>
             <a:fld id="{82D8F485-638F-48F0-AE9F-48157F84472E}" type="datetimeFigureOut">
               <a:rPr lang="bg-BG" smtClean="0"/>
-              <a:t>26.3.2023 г.</a:t>
+              <a:t>27.3.2023 г.</a:t>
             </a:fld>
             <a:endParaRPr lang="bg-BG"/>
           </a:p>
@@ -2929,7 +2934,7 @@
           <a:p>
             <a:fld id="{82D8F485-638F-48F0-AE9F-48157F84472E}" type="datetimeFigureOut">
               <a:rPr lang="bg-BG" smtClean="0"/>
-              <a:t>26.3.2023 г.</a:t>
+              <a:t>27.3.2023 г.</a:t>
             </a:fld>
             <a:endParaRPr lang="bg-BG"/>
           </a:p>
@@ -3687,13 +3692,13 @@
   <p:clrMapOvr>
     <a:masterClrMapping/>
   </p:clrMapOvr>
-  <mc:AlternateContent xmlns:mc="http://schemas.openxmlformats.org/markup-compatibility/2006">
-    <mc:Choice xmlns:p14="http://schemas.microsoft.com/office/powerpoint/2010/main" Requires="p14">
+  <mc:AlternateContent xmlns:mc="http://schemas.openxmlformats.org/markup-compatibility/2006" xmlns:p14="http://schemas.microsoft.com/office/powerpoint/2010/main">
+    <mc:Choice Requires="p14">
       <p:transition spd="slow" p14:dur="3400">
         <p14:reveal/>
       </p:transition>
     </mc:Choice>
-    <mc:Fallback>
+    <mc:Fallback xmlns="">
       <p:transition spd="slow">
         <p:fade/>
       </p:transition>
@@ -4985,13 +4990,13 @@
   <p:clrMapOvr>
     <a:masterClrMapping/>
   </p:clrMapOvr>
-  <mc:AlternateContent xmlns:mc="http://schemas.openxmlformats.org/markup-compatibility/2006">
-    <mc:Choice xmlns:p14="http://schemas.microsoft.com/office/powerpoint/2010/main" Requires="p14">
+  <mc:AlternateContent xmlns:mc="http://schemas.openxmlformats.org/markup-compatibility/2006" xmlns:p14="http://schemas.microsoft.com/office/powerpoint/2010/main">
+    <mc:Choice Requires="p14">
       <p:transition spd="slow" p14:dur="1500">
         <p:split orient="vert"/>
       </p:transition>
     </mc:Choice>
-    <mc:Fallback>
+    <mc:Fallback xmlns="">
       <p:transition spd="slow">
         <p:split orient="vert"/>
       </p:transition>
@@ -5740,13 +5745,13 @@
   <p:clrMapOvr>
     <a:masterClrMapping/>
   </p:clrMapOvr>
-  <mc:AlternateContent xmlns:mc="http://schemas.openxmlformats.org/markup-compatibility/2006">
-    <mc:Choice xmlns:p15="http://schemas.microsoft.com/office/powerpoint/2012/main" Requires="p15">
+  <mc:AlternateContent xmlns:mc="http://schemas.openxmlformats.org/markup-compatibility/2006" xmlns:p15="http://schemas.microsoft.com/office/powerpoint/2012/main">
+    <mc:Choice Requires="p15">
       <p:transition xmlns:p14="http://schemas.microsoft.com/office/powerpoint/2010/main" spd="slow" p14:dur="2000">
         <p15:prstTrans prst="drape"/>
       </p:transition>
     </mc:Choice>
-    <mc:Fallback>
+    <mc:Fallback xmlns="">
       <p:transition spd="slow">
         <p:fade/>
       </p:transition>

</xml_diff>